<commit_message>
Logic Change for Correct Game
</commit_message>
<xml_diff>
--- a/Strategic tic tac toe demo slides.pptx
+++ b/Strategic tic tac toe demo slides.pptx
@@ -204,7 +204,7 @@
           <a:p>
             <a:fld id="{6F0F4F72-BE12-6B40-85E7-2531C5E4121E}" type="datetimeFigureOut">
               <a:rPr lang="en-US" smtClean="0"/>
-              <a:t>5/1/23</a:t>
+              <a:t>5/1/2023</a:t>
             </a:fld>
             <a:endParaRPr lang="en-US"/>
           </a:p>
@@ -705,7 +705,7 @@
           <a:p>
             <a:fld id="{F4BD9B5C-1C1A-0B45-AE90-E5227C2345B1}" type="datetimeFigureOut">
               <a:rPr lang="en-US" smtClean="0"/>
-              <a:t>5/1/23</a:t>
+              <a:t>5/1/2023</a:t>
             </a:fld>
             <a:endParaRPr lang="en-US"/>
           </a:p>
@@ -903,7 +903,7 @@
           <a:p>
             <a:fld id="{F4BD9B5C-1C1A-0B45-AE90-E5227C2345B1}" type="datetimeFigureOut">
               <a:rPr lang="en-US" smtClean="0"/>
-              <a:t>5/1/23</a:t>
+              <a:t>5/1/2023</a:t>
             </a:fld>
             <a:endParaRPr lang="en-US"/>
           </a:p>
@@ -1111,7 +1111,7 @@
           <a:p>
             <a:fld id="{F4BD9B5C-1C1A-0B45-AE90-E5227C2345B1}" type="datetimeFigureOut">
               <a:rPr lang="en-US" smtClean="0"/>
-              <a:t>5/1/23</a:t>
+              <a:t>5/1/2023</a:t>
             </a:fld>
             <a:endParaRPr lang="en-US"/>
           </a:p>
@@ -1309,7 +1309,7 @@
           <a:p>
             <a:fld id="{F4BD9B5C-1C1A-0B45-AE90-E5227C2345B1}" type="datetimeFigureOut">
               <a:rPr lang="en-US" smtClean="0"/>
-              <a:t>5/1/23</a:t>
+              <a:t>5/1/2023</a:t>
             </a:fld>
             <a:endParaRPr lang="en-US"/>
           </a:p>
@@ -1584,7 +1584,7 @@
           <a:p>
             <a:fld id="{F4BD9B5C-1C1A-0B45-AE90-E5227C2345B1}" type="datetimeFigureOut">
               <a:rPr lang="en-US" smtClean="0"/>
-              <a:t>5/1/23</a:t>
+              <a:t>5/1/2023</a:t>
             </a:fld>
             <a:endParaRPr lang="en-US"/>
           </a:p>
@@ -1849,7 +1849,7 @@
           <a:p>
             <a:fld id="{F4BD9B5C-1C1A-0B45-AE90-E5227C2345B1}" type="datetimeFigureOut">
               <a:rPr lang="en-US" smtClean="0"/>
-              <a:t>5/1/23</a:t>
+              <a:t>5/1/2023</a:t>
             </a:fld>
             <a:endParaRPr lang="en-US"/>
           </a:p>
@@ -2261,7 +2261,7 @@
           <a:p>
             <a:fld id="{F4BD9B5C-1C1A-0B45-AE90-E5227C2345B1}" type="datetimeFigureOut">
               <a:rPr lang="en-US" smtClean="0"/>
-              <a:t>5/1/23</a:t>
+              <a:t>5/1/2023</a:t>
             </a:fld>
             <a:endParaRPr lang="en-US"/>
           </a:p>
@@ -2402,7 +2402,7 @@
           <a:p>
             <a:fld id="{F4BD9B5C-1C1A-0B45-AE90-E5227C2345B1}" type="datetimeFigureOut">
               <a:rPr lang="en-US" smtClean="0"/>
-              <a:t>5/1/23</a:t>
+              <a:t>5/1/2023</a:t>
             </a:fld>
             <a:endParaRPr lang="en-US"/>
           </a:p>
@@ -2515,7 +2515,7 @@
           <a:p>
             <a:fld id="{F4BD9B5C-1C1A-0B45-AE90-E5227C2345B1}" type="datetimeFigureOut">
               <a:rPr lang="en-US" smtClean="0"/>
-              <a:t>5/1/23</a:t>
+              <a:t>5/1/2023</a:t>
             </a:fld>
             <a:endParaRPr lang="en-US"/>
           </a:p>
@@ -2826,7 +2826,7 @@
           <a:p>
             <a:fld id="{F4BD9B5C-1C1A-0B45-AE90-E5227C2345B1}" type="datetimeFigureOut">
               <a:rPr lang="en-US" smtClean="0"/>
-              <a:t>5/1/23</a:t>
+              <a:t>5/1/2023</a:t>
             </a:fld>
             <a:endParaRPr lang="en-US"/>
           </a:p>
@@ -3114,7 +3114,7 @@
           <a:p>
             <a:fld id="{F4BD9B5C-1C1A-0B45-AE90-E5227C2345B1}" type="datetimeFigureOut">
               <a:rPr lang="en-US" smtClean="0"/>
-              <a:t>5/1/23</a:t>
+              <a:t>5/1/2023</a:t>
             </a:fld>
             <a:endParaRPr lang="en-US"/>
           </a:p>
@@ -3365,7 +3365,7 @@
           <a:p>
             <a:fld id="{F4BD9B5C-1C1A-0B45-AE90-E5227C2345B1}" type="datetimeFigureOut">
               <a:rPr lang="en-US" smtClean="0"/>
-              <a:t>5/1/23</a:t>
+              <a:t>5/1/2023</a:t>
             </a:fld>
             <a:endParaRPr lang="en-US"/>
           </a:p>
@@ -4822,8 +4822,27 @@
                   <a:srgbClr val="FFFF00"/>
                 </a:highlight>
               </a:rPr>
-              <a:t>(Jacob)</a:t>
-            </a:r>
+              <a:t>(Jacob) (Yeah it was </a:t>
+            </a:r>
+            <a:r>
+              <a:rPr lang="en-US">
+                <a:solidFill>
+                  <a:srgbClr val="FF0000"/>
+                </a:solidFill>
+                <a:highlight>
+                  <a:srgbClr val="FFFF00"/>
+                </a:highlight>
+              </a:rPr>
+              <a:t>pretty bad)</a:t>
+            </a:r>
+            <a:endParaRPr lang="en-US" dirty="0">
+              <a:solidFill>
+                <a:srgbClr val="FF0000"/>
+              </a:solidFill>
+              <a:highlight>
+                <a:srgbClr val="FFFF00"/>
+              </a:highlight>
+            </a:endParaRPr>
           </a:p>
           <a:p>
             <a:endParaRPr lang="en-US" dirty="0"/>

</xml_diff>

<commit_message>
Changed team name to X's and O's and C's
</commit_message>
<xml_diff>
--- a/Strategic tic tac toe demo slides.pptx
+++ b/Strategic tic tac toe demo slides.pptx
@@ -3860,9 +3860,10 @@
           <a:lstStyle/>
           <a:p>
             <a:r>
-              <a:rPr lang="en-US" dirty="0"/>
-              <a:t>By Team Awesome</a:t>
-            </a:r>
+              <a:rPr lang="en-US"/>
+              <a:t>By X’s and O’s and C’s</a:t>
+            </a:r>
+            <a:endParaRPr lang="en-US" dirty="0"/>
           </a:p>
         </p:txBody>
       </p:sp>

</xml_diff>